<commit_message>
updated logo of project
</commit_message>
<xml_diff>
--- a/WSR_Framework.pptx
+++ b/WSR_Framework.pptx
@@ -6829,9 +6829,10 @@
           <a:lstStyle/>
           <a:p>
             <a:r>
-              <a:rPr lang="en-US" dirty="0"/>
-              <a:t>01 SEPTEMBER 2023</a:t>
-            </a:r>
+              <a:rPr lang="en-US"/>
+              <a:t>13 SEPTEMBER 2025</a:t>
+            </a:r>
+            <a:endParaRPr lang="en-US" dirty="0"/>
           </a:p>
         </p:txBody>
       </p:sp>
@@ -7177,15 +7178,6 @@
 </file>
 
 <file path=customXml/item2.xml><?xml version="1.0" encoding="utf-8"?>
-<?mso-contentType ?>
-<FormTemplates xmlns="http://schemas.microsoft.com/sharepoint/v3/contenttype/forms">
-  <Display>DocumentLibraryForm</Display>
-  <Edit>DocumentLibraryForm</Edit>
-  <New>DocumentLibraryForm</New>
-</FormTemplates>
-</file>
-
-<file path=customXml/item3.xml><?xml version="1.0" encoding="utf-8"?>
 <ct:contentTypeSchema xmlns:ct="http://schemas.microsoft.com/office/2006/metadata/contentType" xmlns:ma="http://schemas.microsoft.com/office/2006/metadata/properties/metaAttributes" ct:_="" ma:_="" ma:contentTypeName="Document" ma:contentTypeID="0x010100DDE0E9F5FAC1744A95BA178F781A13F5" ma:contentTypeVersion="7" ma:contentTypeDescription="Create a new document." ma:contentTypeScope="" ma:versionID="26aa64c00d350c875dec6ec26a13dde8">
   <xsd:schema xmlns:xsd="http://www.w3.org/2001/XMLSchema" xmlns:xs="http://www.w3.org/2001/XMLSchema" xmlns:p="http://schemas.microsoft.com/office/2006/metadata/properties" xmlns:ns2="fc3b5812-f652-4ef4-a3fd-dac3fd540c53" targetNamespace="http://schemas.microsoft.com/office/2006/metadata/properties" ma:root="true" ma:fieldsID="fa5b69eeccc5e08a3d64581d2b1aa1ad" ns2:_="">
     <xsd:import namespace="fc3b5812-f652-4ef4-a3fd-dac3fd540c53"/>
@@ -7347,6 +7339,15 @@
 </ct:contentTypeSchema>
 </file>
 
+<file path=customXml/item3.xml><?xml version="1.0" encoding="utf-8"?>
+<?mso-contentType ?>
+<FormTemplates xmlns="http://schemas.microsoft.com/sharepoint/v3/contenttype/forms">
+  <Display>DocumentLibraryForm</Display>
+  <Edit>DocumentLibraryForm</Edit>
+  <New>DocumentLibraryForm</New>
+</FormTemplates>
+</file>
+
 <file path=customXml/itemProps1.xml><?xml version="1.0" encoding="utf-8"?>
 <ds:datastoreItem xmlns:ds="http://schemas.openxmlformats.org/officeDocument/2006/customXml" ds:itemID="{8A9D4491-36D2-43DD-B9D4-3318AEA00677}">
   <ds:schemaRefs>
@@ -7364,14 +7365,6 @@
 </file>
 
 <file path=customXml/itemProps2.xml><?xml version="1.0" encoding="utf-8"?>
-<ds:datastoreItem xmlns:ds="http://schemas.openxmlformats.org/officeDocument/2006/customXml" ds:itemID="{E408A667-6AB3-439A-83F7-D5ED3F68BDC1}">
-  <ds:schemaRefs>
-    <ds:schemaRef ds:uri="http://schemas.microsoft.com/sharepoint/v3/contenttype/forms"/>
-  </ds:schemaRefs>
-</ds:datastoreItem>
-</file>
-
-<file path=customXml/itemProps3.xml><?xml version="1.0" encoding="utf-8"?>
 <ds:datastoreItem xmlns:ds="http://schemas.openxmlformats.org/officeDocument/2006/customXml" ds:itemID="{E058A407-6C3A-4BD1-B01F-92D5AFA57A51}">
   <ds:schemaRefs>
     <ds:schemaRef ds:uri="http://schemas.microsoft.com/office/2006/metadata/contentType"/>
@@ -7389,6 +7382,14 @@
 </ds:datastoreItem>
 </file>
 
+<file path=customXml/itemProps3.xml><?xml version="1.0" encoding="utf-8"?>
+<ds:datastoreItem xmlns:ds="http://schemas.openxmlformats.org/officeDocument/2006/customXml" ds:itemID="{E408A667-6AB3-439A-83F7-D5ED3F68BDC1}">
+  <ds:schemaRefs>
+    <ds:schemaRef ds:uri="http://schemas.microsoft.com/sharepoint/v3/contenttype/forms"/>
+  </ds:schemaRefs>
+</ds:datastoreItem>
+</file>
+
 <file path=docMetadata/LabelInfo.xml><?xml version="1.0" encoding="utf-8"?>
 <clbl:labelList xmlns:clbl="http://schemas.microsoft.com/office/2020/mipLabelMetadata">
   <clbl:label id="{2161a74d-1c3e-4d34-a8c8-131360d2e92c}" enabled="0" method="" siteId="{2161a74d-1c3e-4d34-a8c8-131360d2e92c}" removed="1"/>

</xml_diff>